<commit_message>
Add Tiny URL Design
</commit_message>
<xml_diff>
--- a/Notification System Design.pptx
+++ b/Notification System Design.pptx
@@ -8,6 +8,7 @@
     <p:sldId id="256" r:id="rId2"/>
     <p:sldId id="257" r:id="rId3"/>
     <p:sldId id="258" r:id="rId4"/>
+    <p:sldId id="259" r:id="rId5"/>
   </p:sldIdLst>
   <p:sldSz cx="12192000" cy="6858000"/>
   <p:notesSz cx="6858000" cy="9144000"/>
@@ -261,7 +262,7 @@
           <a:p>
             <a:fld id="{06C28339-2151-49AF-B4B9-DF404CFA876A}" type="datetimeFigureOut">
               <a:rPr lang="he-IL" smtClean="0"/>
-              <a:t>י"ג/סיון/תשפ"א</a:t>
+              <a:t>י"ז/סיון/תשפ"א</a:t>
             </a:fld>
             <a:endParaRPr lang="he-IL"/>
           </a:p>
@@ -459,7 +460,7 @@
           <a:p>
             <a:fld id="{06C28339-2151-49AF-B4B9-DF404CFA876A}" type="datetimeFigureOut">
               <a:rPr lang="he-IL" smtClean="0"/>
-              <a:t>י"ג/סיון/תשפ"א</a:t>
+              <a:t>י"ז/סיון/תשפ"א</a:t>
             </a:fld>
             <a:endParaRPr lang="he-IL"/>
           </a:p>
@@ -667,7 +668,7 @@
           <a:p>
             <a:fld id="{06C28339-2151-49AF-B4B9-DF404CFA876A}" type="datetimeFigureOut">
               <a:rPr lang="he-IL" smtClean="0"/>
-              <a:t>י"ג/סיון/תשפ"א</a:t>
+              <a:t>י"ז/סיון/תשפ"א</a:t>
             </a:fld>
             <a:endParaRPr lang="he-IL"/>
           </a:p>
@@ -865,7 +866,7 @@
           <a:p>
             <a:fld id="{06C28339-2151-49AF-B4B9-DF404CFA876A}" type="datetimeFigureOut">
               <a:rPr lang="he-IL" smtClean="0"/>
-              <a:t>י"ג/סיון/תשפ"א</a:t>
+              <a:t>י"ז/סיון/תשפ"א</a:t>
             </a:fld>
             <a:endParaRPr lang="he-IL"/>
           </a:p>
@@ -1140,7 +1141,7 @@
           <a:p>
             <a:fld id="{06C28339-2151-49AF-B4B9-DF404CFA876A}" type="datetimeFigureOut">
               <a:rPr lang="he-IL" smtClean="0"/>
-              <a:t>י"ג/סיון/תשפ"א</a:t>
+              <a:t>י"ז/סיון/תשפ"א</a:t>
             </a:fld>
             <a:endParaRPr lang="he-IL"/>
           </a:p>
@@ -1405,7 +1406,7 @@
           <a:p>
             <a:fld id="{06C28339-2151-49AF-B4B9-DF404CFA876A}" type="datetimeFigureOut">
               <a:rPr lang="he-IL" smtClean="0"/>
-              <a:t>י"ג/סיון/תשפ"א</a:t>
+              <a:t>י"ז/סיון/תשפ"א</a:t>
             </a:fld>
             <a:endParaRPr lang="he-IL"/>
           </a:p>
@@ -1817,7 +1818,7 @@
           <a:p>
             <a:fld id="{06C28339-2151-49AF-B4B9-DF404CFA876A}" type="datetimeFigureOut">
               <a:rPr lang="he-IL" smtClean="0"/>
-              <a:t>י"ג/סיון/תשפ"א</a:t>
+              <a:t>י"ז/סיון/תשפ"א</a:t>
             </a:fld>
             <a:endParaRPr lang="he-IL"/>
           </a:p>
@@ -1958,7 +1959,7 @@
           <a:p>
             <a:fld id="{06C28339-2151-49AF-B4B9-DF404CFA876A}" type="datetimeFigureOut">
               <a:rPr lang="he-IL" smtClean="0"/>
-              <a:t>י"ג/סיון/תשפ"א</a:t>
+              <a:t>י"ז/סיון/תשפ"א</a:t>
             </a:fld>
             <a:endParaRPr lang="he-IL"/>
           </a:p>
@@ -2071,7 +2072,7 @@
           <a:p>
             <a:fld id="{06C28339-2151-49AF-B4B9-DF404CFA876A}" type="datetimeFigureOut">
               <a:rPr lang="he-IL" smtClean="0"/>
-              <a:t>י"ג/סיון/תשפ"א</a:t>
+              <a:t>י"ז/סיון/תשפ"א</a:t>
             </a:fld>
             <a:endParaRPr lang="he-IL"/>
           </a:p>
@@ -2382,7 +2383,7 @@
           <a:p>
             <a:fld id="{06C28339-2151-49AF-B4B9-DF404CFA876A}" type="datetimeFigureOut">
               <a:rPr lang="he-IL" smtClean="0"/>
-              <a:t>י"ג/סיון/תשפ"א</a:t>
+              <a:t>י"ז/סיון/תשפ"א</a:t>
             </a:fld>
             <a:endParaRPr lang="he-IL"/>
           </a:p>
@@ -2670,7 +2671,7 @@
           <a:p>
             <a:fld id="{06C28339-2151-49AF-B4B9-DF404CFA876A}" type="datetimeFigureOut">
               <a:rPr lang="he-IL" smtClean="0"/>
-              <a:t>י"ג/סיון/תשפ"א</a:t>
+              <a:t>י"ז/סיון/תשפ"א</a:t>
             </a:fld>
             <a:endParaRPr lang="he-IL"/>
           </a:p>
@@ -2911,7 +2912,7 @@
           <a:p>
             <a:fld id="{06C28339-2151-49AF-B4B9-DF404CFA876A}" type="datetimeFigureOut">
               <a:rPr lang="he-IL" smtClean="0"/>
-              <a:t>י"ג/סיון/תשפ"א</a:t>
+              <a:t>י"ז/סיון/תשפ"א</a:t>
             </a:fld>
             <a:endParaRPr lang="he-IL"/>
           </a:p>
@@ -9826,13 +9827,13 @@
           </p:cNvPr>
           <p:cNvCxnSpPr>
             <a:cxnSpLocks/>
-            <a:stCxn id="47" idx="0"/>
-            <a:endCxn id="167" idx="2"/>
+            <a:stCxn id="167" idx="2"/>
+            <a:endCxn id="47" idx="0"/>
           </p:cNvCxnSpPr>
           <p:nvPr/>
         </p:nvCxnSpPr>
         <p:spPr>
-          <a:xfrm flipH="1" flipV="1">
+          <a:xfrm>
             <a:off x="5263124" y="2874791"/>
             <a:ext cx="2058" cy="849815"/>
           </a:xfrm>
@@ -15661,6 +15662,1743 @@
     <p:extLst>
       <p:ext uri="{BB962C8B-B14F-4D97-AF65-F5344CB8AC3E}">
         <p14:creationId xmlns:p14="http://schemas.microsoft.com/office/powerpoint/2010/main" val="2068844558"/>
+      </p:ext>
+    </p:extLst>
+  </p:cSld>
+  <p:clrMapOvr>
+    <a:masterClrMapping/>
+  </p:clrMapOvr>
+</p:sld>
+</file>
+
+<file path=ppt/slides/slide4.xml><?xml version="1.0" encoding="utf-8"?>
+<p:sld xmlns:a="http://schemas.openxmlformats.org/drawingml/2006/main" xmlns:r="http://schemas.openxmlformats.org/officeDocument/2006/relationships" xmlns:p="http://schemas.openxmlformats.org/presentationml/2006/main">
+  <p:cSld>
+    <p:spTree>
+      <p:nvGrpSpPr>
+        <p:cNvPr id="1" name=""/>
+        <p:cNvGrpSpPr/>
+        <p:nvPr/>
+      </p:nvGrpSpPr>
+      <p:grpSpPr>
+        <a:xfrm>
+          <a:off x="0" y="0"/>
+          <a:ext cx="0" cy="0"/>
+          <a:chOff x="0" y="0"/>
+          <a:chExt cx="0" cy="0"/>
+        </a:xfrm>
+      </p:grpSpPr>
+      <mc:AlternateContent xmlns:mc="http://schemas.openxmlformats.org/markup-compatibility/2006">
+        <mc:Choice xmlns:a14="http://schemas.microsoft.com/office/drawing/2010/main" Requires="a14">
+          <p:sp>
+            <p:nvSpPr>
+              <p:cNvPr id="4" name="תיבת טקסט 3">
+                <a:extLst>
+                  <a:ext uri="{FF2B5EF4-FFF2-40B4-BE49-F238E27FC236}">
+                    <a16:creationId xmlns:a16="http://schemas.microsoft.com/office/drawing/2014/main" id="{89CD38C8-6E36-44E8-B1E0-A19CBFF0802E}"/>
+                  </a:ext>
+                </a:extLst>
+              </p:cNvPr>
+              <p:cNvSpPr txBox="1"/>
+              <p:nvPr/>
+            </p:nvSpPr>
+            <p:spPr>
+              <a:xfrm>
+                <a:off x="274979" y="453788"/>
+                <a:ext cx="5668621" cy="3477875"/>
+              </a:xfrm>
+              <a:prstGeom prst="rect">
+                <a:avLst/>
+              </a:prstGeom>
+              <a:noFill/>
+              <a:ln>
+                <a:solidFill>
+                  <a:schemeClr val="tx1"/>
+                </a:solidFill>
+              </a:ln>
+            </p:spPr>
+            <p:txBody>
+              <a:bodyPr wrap="square" rtlCol="1">
+                <a:spAutoFit/>
+              </a:bodyPr>
+              <a:lstStyle/>
+              <a:p>
+                <a:pPr algn="l" rtl="0"/>
+                <a:r>
+                  <a:rPr lang="en-IL" sz="1000" dirty="0"/>
+                  <a:t>We need to ask the interviewer:</a:t>
+                </a:r>
+                <a:br>
+                  <a:rPr lang="en-IL" sz="1000" dirty="0"/>
+                </a:br>
+                <a:endParaRPr lang="en-IL" sz="1000" dirty="0"/>
+              </a:p>
+              <a:p>
+                <a:pPr marL="628650" lvl="1" indent="-171450" algn="l" rtl="0">
+                  <a:buFont typeface="Arial" panose="020B0604020202020204" pitchFamily="34" charset="0"/>
+                  <a:buChar char="•"/>
+                </a:pPr>
+                <a:r>
+                  <a:rPr lang="en-IL" sz="1000" dirty="0"/>
+                  <a:t>What is the expected traffic?</a:t>
+                </a:r>
+              </a:p>
+              <a:p>
+                <a:pPr marL="628650" lvl="1" indent="-171450" algn="l" rtl="0">
+                  <a:buFont typeface="Arial" panose="020B0604020202020204" pitchFamily="34" charset="0"/>
+                  <a:buChar char="•"/>
+                </a:pPr>
+                <a:r>
+                  <a:rPr lang="en-IL" sz="1000" dirty="0"/>
+                  <a:t>How many URLs to support?</a:t>
+                </a:r>
+              </a:p>
+              <a:p>
+                <a:pPr marL="628650" lvl="1" indent="-171450" algn="l" rtl="0">
+                  <a:buFont typeface="Arial" panose="020B0604020202020204" pitchFamily="34" charset="0"/>
+                  <a:buChar char="•"/>
+                </a:pPr>
+                <a:r>
+                  <a:rPr lang="en-IL" sz="1000" dirty="0"/>
+                  <a:t>How much time do we need to preserve the URL?</a:t>
+                </a:r>
+              </a:p>
+              <a:p>
+                <a:pPr algn="l" rtl="0"/>
+                <a:endParaRPr lang="en-IL" sz="1000" dirty="0"/>
+              </a:p>
+              <a:p>
+                <a:pPr algn="l" rtl="0"/>
+                <a:r>
+                  <a:rPr lang="en-IL" sz="1000" dirty="0"/>
+                  <a:t>Let’s assume that we need to preserve the URL for 10 years, so if we have X URL assignments in a seconds, we need to support </a:t>
+                </a:r>
+              </a:p>
+              <a:p>
+                <a:pPr algn="l" rtl="0"/>
+                <a:endParaRPr lang="en-IL" sz="1000" dirty="0">
+                  <a:solidFill>
+                    <a:srgbClr val="FF0000"/>
+                  </a:solidFill>
+                </a:endParaRPr>
+              </a:p>
+              <a:p>
+                <a:pPr algn="ctr" rtl="0"/>
+                <a:r>
+                  <a:rPr lang="en-IL" sz="1000" dirty="0">
+                    <a:solidFill>
+                      <a:srgbClr val="FF0000"/>
+                    </a:solidFill>
+                  </a:rPr>
+                  <a:t>	</a:t>
+                </a:r>
+                <a:r>
+                  <a:rPr lang="en-IL" sz="1000" dirty="0"/>
+                  <a:t>Y = X * 60 * 60 * 24 * 365 * 10 different URLs!</a:t>
+                </a:r>
+              </a:p>
+              <a:p>
+                <a:pPr algn="ctr" rtl="0"/>
+                <a:endParaRPr lang="en-IL" sz="1000" dirty="0"/>
+              </a:p>
+              <a:p>
+                <a:pPr algn="l" rtl="0"/>
+                <a:r>
+                  <a:rPr lang="en-IL" sz="1000" dirty="0"/>
+                  <a:t>The URL is a combination of chars: a-z,A-Z,0-9, so we have a 62 unique chars we can use! If we’ll use only 2 chars in our URL generation routine, we’ll  have 62^2 different URLs we can generate. From our requirements, we can determine the minimum number characters in the URL that we need to use:</a:t>
+                </a:r>
+              </a:p>
+              <a:p>
+                <a:pPr algn="ctr" rtl="0"/>
+                <a:br>
+                  <a:rPr lang="en-IL" sz="1000" dirty="0"/>
+                </a:br>
+                <a:r>
+                  <a:rPr lang="en-IL" sz="1000" dirty="0"/>
+                  <a:t>	</a:t>
+                </a:r>
+                <a14:m>
+                  <m:oMath xmlns:m="http://schemas.openxmlformats.org/officeDocument/2006/math">
+                    <m:sSub>
+                      <m:sSubPr>
+                        <m:ctrlPr>
+                          <a:rPr lang="en-IL" sz="1000" i="1" smtClean="0">
+                            <a:solidFill>
+                              <a:schemeClr val="tx1"/>
+                            </a:solidFill>
+                            <a:latin typeface="Cambria Math" panose="02040503050406030204" pitchFamily="18" charset="0"/>
+                          </a:rPr>
+                        </m:ctrlPr>
+                      </m:sSubPr>
+                      <m:e>
+                        <m:r>
+                          <a:rPr lang="en-IL" sz="1000" b="0" i="1" smtClean="0">
+                            <a:solidFill>
+                              <a:schemeClr val="tx1"/>
+                            </a:solidFill>
+                            <a:latin typeface="Cambria Math" panose="02040503050406030204" pitchFamily="18" charset="0"/>
+                          </a:rPr>
+                          <m:t>𝐿𝑒𝑛𝑔𝑡</m:t>
+                        </m:r>
+                        <m:r>
+                          <a:rPr lang="en-IL" sz="1000" b="0" i="1" smtClean="0">
+                            <a:solidFill>
+                              <a:schemeClr val="tx1"/>
+                            </a:solidFill>
+                            <a:latin typeface="Cambria Math" panose="02040503050406030204" pitchFamily="18" charset="0"/>
+                          </a:rPr>
+                          <m:t>h</m:t>
+                        </m:r>
+                        <m:r>
+                          <a:rPr lang="en-IL" sz="1000" b="0" i="1" smtClean="0">
+                            <a:solidFill>
+                              <a:schemeClr val="tx1"/>
+                            </a:solidFill>
+                            <a:latin typeface="Cambria Math" panose="02040503050406030204" pitchFamily="18" charset="0"/>
+                          </a:rPr>
+                          <m:t>= </m:t>
+                        </m:r>
+                        <m:r>
+                          <a:rPr lang="en-IL" sz="1000" b="0" i="1" smtClean="0">
+                            <a:solidFill>
+                              <a:schemeClr val="tx1"/>
+                            </a:solidFill>
+                            <a:latin typeface="Cambria Math" panose="02040503050406030204" pitchFamily="18" charset="0"/>
+                          </a:rPr>
+                          <m:t>𝑙𝑜𝑔</m:t>
+                        </m:r>
+                      </m:e>
+                      <m:sub>
+                        <m:r>
+                          <a:rPr lang="en-IL" sz="1000" b="0" i="1" smtClean="0">
+                            <a:solidFill>
+                              <a:schemeClr val="tx1"/>
+                            </a:solidFill>
+                            <a:latin typeface="Cambria Math" panose="02040503050406030204" pitchFamily="18" charset="0"/>
+                          </a:rPr>
+                          <m:t>62</m:t>
+                        </m:r>
+                      </m:sub>
+                    </m:sSub>
+                    <m:r>
+                      <a:rPr lang="en-IL" sz="1000" b="0" i="1" smtClean="0">
+                        <a:solidFill>
+                          <a:schemeClr val="tx1"/>
+                        </a:solidFill>
+                        <a:latin typeface="Cambria Math" panose="02040503050406030204" pitchFamily="18" charset="0"/>
+                      </a:rPr>
+                      <m:t>𝑌</m:t>
+                    </m:r>
+                  </m:oMath>
+                </a14:m>
+                <a:endParaRPr lang="en-IL" sz="1000" dirty="0"/>
+              </a:p>
+              <a:p>
+                <a:pPr algn="ctr" rtl="0"/>
+                <a:endParaRPr lang="en-IL" sz="1000" dirty="0"/>
+              </a:p>
+              <a:p>
+                <a:pPr algn="l" rtl="0"/>
+                <a:r>
+                  <a:rPr lang="en-IL" sz="1000" dirty="0"/>
+                  <a:t>BTW: 62^7 = 3.5 trillion! So using 7 characters is suffice.</a:t>
+                </a:r>
+              </a:p>
+              <a:p>
+                <a:pPr algn="l" rtl="0"/>
+                <a:endParaRPr lang="en-IL" sz="1000" dirty="0"/>
+              </a:p>
+              <a:p>
+                <a:pPr algn="l" rtl="0"/>
+                <a:r>
+                  <a:rPr lang="en-IL" sz="1000" dirty="0"/>
+                  <a:t>It is easy to implement an algorithm that converts a base 10 numbers to base 62 ones. So, If we assign each request to generate a URL a unique ID base 10, we can generate from this unique ID a base 62 URL. This is the real problem of the design: </a:t>
+                </a:r>
+                <a:r>
+                  <a:rPr lang="en-IL" sz="1000" b="1" dirty="0"/>
+                  <a:t>How to assign a unique ID to each request in a distributed system!</a:t>
+                </a:r>
+              </a:p>
+            </p:txBody>
+          </p:sp>
+        </mc:Choice>
+        <mc:Fallback>
+          <p:sp>
+            <p:nvSpPr>
+              <p:cNvPr id="4" name="תיבת טקסט 3">
+                <a:extLst>
+                  <a:ext uri="{FF2B5EF4-FFF2-40B4-BE49-F238E27FC236}">
+                    <a16:creationId xmlns:a16="http://schemas.microsoft.com/office/drawing/2014/main" id="{89CD38C8-6E36-44E8-B1E0-A19CBFF0802E}"/>
+                  </a:ext>
+                </a:extLst>
+              </p:cNvPr>
+              <p:cNvSpPr txBox="1">
+                <a:spLocks noRot="1" noChangeAspect="1" noMove="1" noResize="1" noEditPoints="1" noAdjustHandles="1" noChangeArrowheads="1" noChangeShapeType="1" noTextEdit="1"/>
+              </p:cNvSpPr>
+              <p:nvPr/>
+            </p:nvSpPr>
+            <p:spPr>
+              <a:xfrm>
+                <a:off x="274979" y="453788"/>
+                <a:ext cx="5668621" cy="3477875"/>
+              </a:xfrm>
+              <a:prstGeom prst="rect">
+                <a:avLst/>
+              </a:prstGeom>
+              <a:blipFill>
+                <a:blip r:embed="rId2"/>
+                <a:stretch>
+                  <a:fillRect r="-107"/>
+                </a:stretch>
+              </a:blipFill>
+              <a:ln>
+                <a:solidFill>
+                  <a:schemeClr val="tx1"/>
+                </a:solidFill>
+              </a:ln>
+            </p:spPr>
+            <p:txBody>
+              <a:bodyPr/>
+              <a:lstStyle/>
+              <a:p>
+                <a:r>
+                  <a:rPr lang="he-IL">
+                    <a:noFill/>
+                  </a:rPr>
+                  <a:t> </a:t>
+                </a:r>
+              </a:p>
+            </p:txBody>
+          </p:sp>
+        </mc:Fallback>
+      </mc:AlternateContent>
+      <p:sp>
+        <p:nvSpPr>
+          <p:cNvPr id="5" name="תיבת טקסט 4">
+            <a:extLst>
+              <a:ext uri="{FF2B5EF4-FFF2-40B4-BE49-F238E27FC236}">
+                <a16:creationId xmlns:a16="http://schemas.microsoft.com/office/drawing/2014/main" id="{DA7CFC87-325B-4DD0-ACBC-058286B854C9}"/>
+              </a:ext>
+            </a:extLst>
+          </p:cNvPr>
+          <p:cNvSpPr txBox="1"/>
+          <p:nvPr/>
+        </p:nvSpPr>
+        <p:spPr>
+          <a:xfrm>
+            <a:off x="4896729" y="24939"/>
+            <a:ext cx="2398542" cy="369332"/>
+          </a:xfrm>
+          <a:prstGeom prst="rect">
+            <a:avLst/>
+          </a:prstGeom>
+          <a:noFill/>
+        </p:spPr>
+        <p:txBody>
+          <a:bodyPr wrap="none" rtlCol="1">
+            <a:spAutoFit/>
+          </a:bodyPr>
+          <a:lstStyle/>
+          <a:p>
+            <a:r>
+              <a:rPr lang="en-IL" u="sng" dirty="0">
+                <a:ln w="0"/>
+                <a:effectLst>
+                  <a:outerShdw blurRad="38100" dist="19050" dir="2700000" algn="tl" rotWithShape="0">
+                    <a:schemeClr val="dk1">
+                      <a:alpha val="40000"/>
+                    </a:schemeClr>
+                  </a:outerShdw>
+                </a:effectLst>
+              </a:rPr>
+              <a:t>Tiny URL System Design</a:t>
+            </a:r>
+            <a:endParaRPr lang="he-IL" u="sng" dirty="0">
+              <a:ln w="0"/>
+              <a:effectLst>
+                <a:outerShdw blurRad="38100" dist="19050" dir="2700000" algn="tl" rotWithShape="0">
+                  <a:schemeClr val="dk1">
+                    <a:alpha val="40000"/>
+                  </a:schemeClr>
+                </a:outerShdw>
+              </a:effectLst>
+            </a:endParaRPr>
+          </a:p>
+        </p:txBody>
+      </p:sp>
+      <p:sp>
+        <p:nvSpPr>
+          <p:cNvPr id="7" name="תיבת טקסט 6">
+            <a:extLst>
+              <a:ext uri="{FF2B5EF4-FFF2-40B4-BE49-F238E27FC236}">
+                <a16:creationId xmlns:a16="http://schemas.microsoft.com/office/drawing/2014/main" id="{4219192D-B6F1-4AFA-9BED-0FD5D990830E}"/>
+              </a:ext>
+            </a:extLst>
+          </p:cNvPr>
+          <p:cNvSpPr txBox="1"/>
+          <p:nvPr/>
+        </p:nvSpPr>
+        <p:spPr>
+          <a:xfrm>
+            <a:off x="6096000" y="453788"/>
+            <a:ext cx="5821021" cy="4247317"/>
+          </a:xfrm>
+          <a:prstGeom prst="rect">
+            <a:avLst/>
+          </a:prstGeom>
+          <a:noFill/>
+          <a:ln>
+            <a:solidFill>
+              <a:schemeClr val="tx1"/>
+            </a:solidFill>
+          </a:ln>
+        </p:spPr>
+        <p:txBody>
+          <a:bodyPr wrap="square" rtlCol="1">
+            <a:spAutoFit/>
+          </a:bodyPr>
+          <a:lstStyle/>
+          <a:p>
+            <a:pPr algn="l" rtl="0"/>
+            <a:r>
+              <a:rPr lang="en-IL" sz="1000" dirty="0"/>
+              <a:t>How to assign a unique ID to each request in a distributed system?</a:t>
+            </a:r>
+          </a:p>
+          <a:p>
+            <a:pPr algn="l" rtl="0"/>
+            <a:endParaRPr lang="en-IL" sz="1000" dirty="0"/>
+          </a:p>
+          <a:p>
+            <a:pPr marL="171450" indent="-171450" algn="l" rtl="0">
+              <a:buFont typeface="Arial" panose="020B0604020202020204" pitchFamily="34" charset="0"/>
+              <a:buChar char="•"/>
+            </a:pPr>
+            <a:r>
+              <a:rPr lang="en-IL" sz="1000" dirty="0"/>
+              <a:t>Flicker </a:t>
+            </a:r>
+            <a:r>
+              <a:rPr lang="en-US" sz="1000" dirty="0"/>
+              <a:t>use</a:t>
+            </a:r>
+            <a:r>
+              <a:rPr lang="en-IL" sz="1000" dirty="0"/>
+              <a:t>s</a:t>
+            </a:r>
+            <a:r>
+              <a:rPr lang="en-US" sz="1000" dirty="0"/>
+              <a:t> a Ticket</a:t>
+            </a:r>
+            <a:r>
+              <a:rPr lang="en-IL" sz="1000" dirty="0"/>
+              <a:t> </a:t>
+            </a:r>
+            <a:r>
+              <a:rPr lang="en-US" sz="1000" dirty="0"/>
+              <a:t>Server </a:t>
+            </a:r>
+            <a:r>
+              <a:rPr lang="en-IL" sz="1000" dirty="0"/>
+              <a:t>which is a </a:t>
+            </a:r>
+            <a:r>
+              <a:rPr lang="en-US" sz="1000" dirty="0"/>
+              <a:t>centralized </a:t>
+            </a:r>
+            <a:r>
+              <a:rPr lang="en-US" sz="1000" dirty="0" err="1"/>
+              <a:t>auto_increment</a:t>
+            </a:r>
+            <a:r>
+              <a:rPr lang="en-US" sz="1000" dirty="0"/>
+              <a:t> feature in a single database server</a:t>
+            </a:r>
+            <a:r>
+              <a:rPr lang="en-IL" sz="1000" dirty="0"/>
+              <a:t>. The problem with this approach is that the server is a </a:t>
+            </a:r>
+            <a:r>
+              <a:rPr lang="en-US" sz="1000" dirty="0"/>
+              <a:t>Single point of failure. Single ticket server means if the ticket server goes down, all</a:t>
+            </a:r>
+            <a:r>
+              <a:rPr lang="en-IL" sz="1000" dirty="0"/>
+              <a:t> </a:t>
+            </a:r>
+            <a:r>
+              <a:rPr lang="en-US" sz="1000" dirty="0"/>
+              <a:t>systems that depend on it will face issues</a:t>
+            </a:r>
+            <a:r>
+              <a:rPr lang="en-IL" sz="1000" dirty="0"/>
+              <a:t>. The solve the SPOF issue Flicker uses </a:t>
+            </a:r>
+            <a:r>
+              <a:rPr lang="en-US" sz="1000" dirty="0"/>
+              <a:t>two ticket servers</a:t>
+            </a:r>
+            <a:r>
+              <a:rPr lang="en-IL" sz="1000" dirty="0"/>
+              <a:t> and </a:t>
+            </a:r>
+            <a:r>
+              <a:rPr lang="en-US" sz="1000" dirty="0"/>
+              <a:t>divide</a:t>
+            </a:r>
+            <a:r>
+              <a:rPr lang="en-IL" sz="1000" dirty="0"/>
+              <a:t>s</a:t>
+            </a:r>
+            <a:r>
+              <a:rPr lang="en-US" sz="1000" dirty="0"/>
+              <a:t> responsibility between the two </a:t>
+            </a:r>
+            <a:r>
+              <a:rPr lang="en-IL" sz="1000" dirty="0"/>
+              <a:t>servers</a:t>
+            </a:r>
+            <a:r>
+              <a:rPr lang="en-US" sz="1000" dirty="0"/>
+              <a:t> by dividing the ID space down the middle</a:t>
+            </a:r>
+            <a:r>
+              <a:rPr lang="en-IL" sz="1000" dirty="0"/>
+              <a:t> to</a:t>
+            </a:r>
+            <a:r>
+              <a:rPr lang="en-US" sz="1000" dirty="0"/>
+              <a:t> evens and odds</a:t>
+            </a:r>
+            <a:r>
+              <a:rPr lang="en-IL" sz="1000" dirty="0"/>
+              <a:t> ID generation.</a:t>
+            </a:r>
+            <a:br>
+              <a:rPr lang="en-IL" sz="1000" dirty="0"/>
+            </a:br>
+            <a:r>
+              <a:rPr lang="en-IL" sz="1000" dirty="0"/>
+              <a:t>(</a:t>
+            </a:r>
+            <a:r>
+              <a:rPr lang="en-IL" sz="1000" dirty="0">
+                <a:hlinkClick r:id="rId3"/>
+              </a:rPr>
+              <a:t>https://code.flickr.net/2010/02/08/ticket-servers-distributed-unique-primary-keys-on-the-cheap</a:t>
+            </a:r>
+            <a:r>
+              <a:rPr lang="en-IL" sz="1000" dirty="0"/>
+              <a:t>)</a:t>
+            </a:r>
+          </a:p>
+          <a:p>
+            <a:pPr algn="l" rtl="0"/>
+            <a:endParaRPr lang="en-IL" sz="1000" dirty="0"/>
+          </a:p>
+          <a:p>
+            <a:pPr marL="171450" indent="-171450" algn="l" rtl="0">
+              <a:buFont typeface="Arial" panose="020B0604020202020204" pitchFamily="34" charset="0"/>
+              <a:buChar char="•"/>
+            </a:pPr>
+            <a:r>
+              <a:rPr lang="en-US" sz="1000" dirty="0"/>
+              <a:t>Twitter snowflake ID</a:t>
+            </a:r>
+            <a:r>
+              <a:rPr lang="en-IL" sz="1000" dirty="0"/>
+              <a:t> </a:t>
+            </a:r>
+            <a:r>
+              <a:rPr lang="en-US" sz="1000" dirty="0"/>
+              <a:t>generator</a:t>
+            </a:r>
+            <a:r>
+              <a:rPr lang="en-IL" sz="1000" dirty="0"/>
+              <a:t> which generates a number using these scheme:</a:t>
+            </a:r>
+            <a:br>
+              <a:rPr lang="en-IL" sz="1000" dirty="0"/>
+            </a:br>
+            <a:br>
+              <a:rPr lang="en-IL" sz="1000" dirty="0"/>
+            </a:br>
+            <a:br>
+              <a:rPr lang="en-IL" sz="1000" dirty="0"/>
+            </a:br>
+            <a:br>
+              <a:rPr lang="en-IL" sz="1000" dirty="0"/>
+            </a:br>
+            <a:br>
+              <a:rPr lang="en-IL" sz="1000" dirty="0"/>
+            </a:br>
+            <a:r>
+              <a:rPr lang="en-US" sz="1000" dirty="0"/>
+              <a:t>Datacenter IDs and machine IDs are chosen at the startup time, generally fixed once the</a:t>
+            </a:r>
+            <a:r>
+              <a:rPr lang="en-IL" sz="1000" dirty="0"/>
+              <a:t> </a:t>
+            </a:r>
+            <a:r>
+              <a:rPr lang="en-US" sz="1000" dirty="0"/>
+              <a:t>system is up running. Any changes in datacenter IDs and machine IDs require careful review</a:t>
+            </a:r>
+            <a:r>
+              <a:rPr lang="en-IL" sz="1000" dirty="0"/>
+              <a:t> </a:t>
+            </a:r>
+            <a:r>
+              <a:rPr lang="en-US" sz="1000" dirty="0"/>
+              <a:t>since an accidental change in those values can lead to ID conflicts. Timestamp and sequence</a:t>
+            </a:r>
+            <a:r>
+              <a:rPr lang="en-IL" sz="1000" dirty="0"/>
+              <a:t> </a:t>
+            </a:r>
+            <a:r>
+              <a:rPr lang="en-US" sz="1000" dirty="0"/>
+              <a:t>numbers are generated when the ID generator is running.</a:t>
+            </a:r>
+            <a:br>
+              <a:rPr lang="en-IL" sz="1000" dirty="0"/>
+            </a:br>
+            <a:endParaRPr lang="en-IL" sz="1000" dirty="0"/>
+          </a:p>
+          <a:p>
+            <a:pPr marL="171450" indent="-171450" algn="l" rtl="0">
+              <a:buFont typeface="Arial" panose="020B0604020202020204" pitchFamily="34" charset="0"/>
+              <a:buChar char="•"/>
+            </a:pPr>
+            <a:r>
+              <a:rPr lang="en-IL" sz="1000" dirty="0"/>
+              <a:t>The guy at </a:t>
+            </a:r>
+            <a:r>
+              <a:rPr lang="en-IL" sz="1000" dirty="0" err="1"/>
+              <a:t>CodeKarle</a:t>
+            </a:r>
+            <a:r>
+              <a:rPr lang="en-IL" sz="1000" dirty="0"/>
+              <a:t> suggests to use a token service that is in charge to provide a range of base 10 numbers to each short URL service machine. The machines will use that range to assign an incoming generate request with an ID that will get converted to base 62. </a:t>
+            </a:r>
+            <a:r>
+              <a:rPr lang="en-US" sz="1000" dirty="0"/>
+              <a:t>The token service will run on a </a:t>
+            </a:r>
+            <a:r>
+              <a:rPr lang="en-US" sz="1000" b="1" dirty="0"/>
+              <a:t>single-threaded </a:t>
+            </a:r>
+            <a:r>
+              <a:rPr lang="en-US" sz="1000" dirty="0"/>
+              <a:t>model and cater to only one machine at a time so that each machine has a different range</a:t>
+            </a:r>
+            <a:r>
+              <a:rPr lang="en-IL" sz="1000" dirty="0"/>
+              <a:t>.</a:t>
+            </a:r>
+            <a:r>
+              <a:rPr lang="en-US" sz="1000" dirty="0"/>
+              <a:t> Our services will only interact with this token service on startup and when they are about to run out of their range, so token service can be something simple like a MySQL service as it will be dealing with a very minimal load. We will of course make sure that this MySQL service is distributed across geographies to reduce latency and also to make sure it is not a single point of failure.</a:t>
+            </a:r>
+            <a:endParaRPr lang="en-IL" sz="1000" dirty="0"/>
+          </a:p>
+        </p:txBody>
+      </p:sp>
+      <p:pic>
+        <p:nvPicPr>
+          <p:cNvPr id="10" name="תמונה 9">
+            <a:extLst>
+              <a:ext uri="{FF2B5EF4-FFF2-40B4-BE49-F238E27FC236}">
+                <a16:creationId xmlns:a16="http://schemas.microsoft.com/office/drawing/2014/main" id="{8F126D6D-47C6-44A1-86E4-BB2D0268884F}"/>
+              </a:ext>
+            </a:extLst>
+          </p:cNvPr>
+          <p:cNvPicPr>
+            <a:picLocks noChangeAspect="1"/>
+          </p:cNvPicPr>
+          <p:nvPr/>
+        </p:nvPicPr>
+        <p:blipFill>
+          <a:blip r:embed="rId4"/>
+          <a:stretch>
+            <a:fillRect/>
+          </a:stretch>
+        </p:blipFill>
+        <p:spPr>
+          <a:xfrm>
+            <a:off x="6914127" y="2069253"/>
+            <a:ext cx="4100237" cy="491567"/>
+          </a:xfrm>
+          <a:prstGeom prst="rect">
+            <a:avLst/>
+          </a:prstGeom>
+        </p:spPr>
+      </p:pic>
+      <p:sp>
+        <p:nvSpPr>
+          <p:cNvPr id="11" name="מלבן 10">
+            <a:extLst>
+              <a:ext uri="{FF2B5EF4-FFF2-40B4-BE49-F238E27FC236}">
+                <a16:creationId xmlns:a16="http://schemas.microsoft.com/office/drawing/2014/main" id="{E5B91B32-55F6-4E34-84BA-3932B584067B}"/>
+              </a:ext>
+            </a:extLst>
+          </p:cNvPr>
+          <p:cNvSpPr/>
+          <p:nvPr/>
+        </p:nvSpPr>
+        <p:spPr>
+          <a:xfrm>
+            <a:off x="219878" y="5444836"/>
+            <a:ext cx="1100676" cy="391393"/>
+          </a:xfrm>
+          <a:prstGeom prst="rect">
+            <a:avLst/>
+          </a:prstGeom>
+          <a:noFill/>
+          <a:ln>
+            <a:solidFill>
+              <a:schemeClr val="accent6"/>
+            </a:solidFill>
+          </a:ln>
+        </p:spPr>
+        <p:style>
+          <a:lnRef idx="2">
+            <a:schemeClr val="accent1">
+              <a:shade val="50000"/>
+            </a:schemeClr>
+          </a:lnRef>
+          <a:fillRef idx="1">
+            <a:schemeClr val="accent1"/>
+          </a:fillRef>
+          <a:effectRef idx="0">
+            <a:schemeClr val="accent1"/>
+          </a:effectRef>
+          <a:fontRef idx="minor">
+            <a:schemeClr val="lt1"/>
+          </a:fontRef>
+        </p:style>
+        <p:txBody>
+          <a:bodyPr rtlCol="1" anchor="ctr"/>
+          <a:lstStyle/>
+          <a:p>
+            <a:pPr algn="ctr"/>
+            <a:r>
+              <a:rPr lang="en-IL" sz="1000" dirty="0">
+                <a:solidFill>
+                  <a:schemeClr val="tx1"/>
+                </a:solidFill>
+              </a:rPr>
+              <a:t>Long to Short UI</a:t>
+            </a:r>
+            <a:endParaRPr lang="he-IL" sz="1000" dirty="0">
+              <a:solidFill>
+                <a:schemeClr val="tx1"/>
+              </a:solidFill>
+            </a:endParaRPr>
+          </a:p>
+        </p:txBody>
+      </p:sp>
+      <p:sp>
+        <p:nvSpPr>
+          <p:cNvPr id="12" name="מלבן 11">
+            <a:extLst>
+              <a:ext uri="{FF2B5EF4-FFF2-40B4-BE49-F238E27FC236}">
+                <a16:creationId xmlns:a16="http://schemas.microsoft.com/office/drawing/2014/main" id="{41BBF233-40F7-4339-90C8-2834EFB614CC}"/>
+              </a:ext>
+            </a:extLst>
+          </p:cNvPr>
+          <p:cNvSpPr/>
+          <p:nvPr/>
+        </p:nvSpPr>
+        <p:spPr>
+          <a:xfrm>
+            <a:off x="1718814" y="4959919"/>
+            <a:ext cx="232756" cy="1359559"/>
+          </a:xfrm>
+          <a:prstGeom prst="rect">
+            <a:avLst/>
+          </a:prstGeom>
+          <a:noFill/>
+          <a:ln>
+            <a:solidFill>
+              <a:schemeClr val="tx1"/>
+            </a:solidFill>
+          </a:ln>
+        </p:spPr>
+        <p:style>
+          <a:lnRef idx="2">
+            <a:schemeClr val="accent1">
+              <a:shade val="50000"/>
+            </a:schemeClr>
+          </a:lnRef>
+          <a:fillRef idx="1">
+            <a:schemeClr val="accent1"/>
+          </a:fillRef>
+          <a:effectRef idx="0">
+            <a:schemeClr val="accent1"/>
+          </a:effectRef>
+          <a:fontRef idx="minor">
+            <a:schemeClr val="lt1"/>
+          </a:fontRef>
+        </p:style>
+        <p:txBody>
+          <a:bodyPr rtlCol="1" anchor="ctr"/>
+          <a:lstStyle/>
+          <a:p>
+            <a:pPr algn="ctr"/>
+            <a:r>
+              <a:rPr lang="en-IL" sz="1000" dirty="0">
+                <a:solidFill>
+                  <a:schemeClr val="tx1"/>
+                </a:solidFill>
+              </a:rPr>
+              <a:t>LB</a:t>
+            </a:r>
+            <a:endParaRPr lang="he-IL" sz="1000" dirty="0">
+              <a:solidFill>
+                <a:schemeClr val="tx1"/>
+              </a:solidFill>
+            </a:endParaRPr>
+          </a:p>
+        </p:txBody>
+      </p:sp>
+      <p:sp>
+        <p:nvSpPr>
+          <p:cNvPr id="14" name="מלבן 13">
+            <a:extLst>
+              <a:ext uri="{FF2B5EF4-FFF2-40B4-BE49-F238E27FC236}">
+                <a16:creationId xmlns:a16="http://schemas.microsoft.com/office/drawing/2014/main" id="{54195C35-787A-457A-90F3-294FCA5E043C}"/>
+              </a:ext>
+            </a:extLst>
+          </p:cNvPr>
+          <p:cNvSpPr/>
+          <p:nvPr/>
+        </p:nvSpPr>
+        <p:spPr>
+          <a:xfrm>
+            <a:off x="2347419" y="5279032"/>
+            <a:ext cx="991724" cy="321892"/>
+          </a:xfrm>
+          <a:prstGeom prst="rect">
+            <a:avLst/>
+          </a:prstGeom>
+          <a:noFill/>
+          <a:ln>
+            <a:solidFill>
+              <a:schemeClr val="accent1"/>
+            </a:solidFill>
+          </a:ln>
+        </p:spPr>
+        <p:style>
+          <a:lnRef idx="2">
+            <a:schemeClr val="accent1">
+              <a:shade val="50000"/>
+            </a:schemeClr>
+          </a:lnRef>
+          <a:fillRef idx="1">
+            <a:schemeClr val="accent1"/>
+          </a:fillRef>
+          <a:effectRef idx="0">
+            <a:schemeClr val="accent1"/>
+          </a:effectRef>
+          <a:fontRef idx="minor">
+            <a:schemeClr val="lt1"/>
+          </a:fontRef>
+        </p:style>
+        <p:txBody>
+          <a:bodyPr rtlCol="1" anchor="ctr"/>
+          <a:lstStyle/>
+          <a:p>
+            <a:pPr algn="ctr" rtl="0"/>
+            <a:r>
+              <a:rPr lang="en-IL" sz="1000" dirty="0">
+                <a:solidFill>
+                  <a:schemeClr val="tx1"/>
+                </a:solidFill>
+              </a:rPr>
+              <a:t>Short URL Service</a:t>
+            </a:r>
+          </a:p>
+        </p:txBody>
+      </p:sp>
+      <p:sp>
+        <p:nvSpPr>
+          <p:cNvPr id="15" name="מלבן 14">
+            <a:extLst>
+              <a:ext uri="{FF2B5EF4-FFF2-40B4-BE49-F238E27FC236}">
+                <a16:creationId xmlns:a16="http://schemas.microsoft.com/office/drawing/2014/main" id="{6FBE1601-ACAA-4087-A308-E2FAE9101680}"/>
+              </a:ext>
+            </a:extLst>
+          </p:cNvPr>
+          <p:cNvSpPr/>
+          <p:nvPr/>
+        </p:nvSpPr>
+        <p:spPr>
+          <a:xfrm>
+            <a:off x="3884065" y="5844542"/>
+            <a:ext cx="991724" cy="321892"/>
+          </a:xfrm>
+          <a:prstGeom prst="rect">
+            <a:avLst/>
+          </a:prstGeom>
+          <a:noFill/>
+          <a:ln>
+            <a:solidFill>
+              <a:schemeClr val="accent1"/>
+            </a:solidFill>
+          </a:ln>
+        </p:spPr>
+        <p:style>
+          <a:lnRef idx="2">
+            <a:schemeClr val="accent1">
+              <a:shade val="50000"/>
+            </a:schemeClr>
+          </a:lnRef>
+          <a:fillRef idx="1">
+            <a:schemeClr val="accent1"/>
+          </a:fillRef>
+          <a:effectRef idx="0">
+            <a:schemeClr val="accent1"/>
+          </a:effectRef>
+          <a:fontRef idx="minor">
+            <a:schemeClr val="lt1"/>
+          </a:fontRef>
+        </p:style>
+        <p:txBody>
+          <a:bodyPr rtlCol="1" anchor="ctr"/>
+          <a:lstStyle/>
+          <a:p>
+            <a:pPr algn="ctr" rtl="0"/>
+            <a:r>
+              <a:rPr lang="en-IL" sz="1000" dirty="0">
+                <a:solidFill>
+                  <a:schemeClr val="tx1"/>
+                </a:solidFill>
+              </a:rPr>
+              <a:t>Token Service</a:t>
+            </a:r>
+          </a:p>
+        </p:txBody>
+      </p:sp>
+      <p:sp>
+        <p:nvSpPr>
+          <p:cNvPr id="16" name="מלבן 15">
+            <a:extLst>
+              <a:ext uri="{FF2B5EF4-FFF2-40B4-BE49-F238E27FC236}">
+                <a16:creationId xmlns:a16="http://schemas.microsoft.com/office/drawing/2014/main" id="{96B1393A-D894-42B3-A4E2-FB4221EC3722}"/>
+              </a:ext>
+            </a:extLst>
+          </p:cNvPr>
+          <p:cNvSpPr/>
+          <p:nvPr/>
+        </p:nvSpPr>
+        <p:spPr>
+          <a:xfrm>
+            <a:off x="3638997" y="4700824"/>
+            <a:ext cx="795716" cy="321892"/>
+          </a:xfrm>
+          <a:prstGeom prst="rect">
+            <a:avLst/>
+          </a:prstGeom>
+          <a:noFill/>
+          <a:ln>
+            <a:solidFill>
+              <a:srgbClr val="FF0000"/>
+            </a:solidFill>
+          </a:ln>
+        </p:spPr>
+        <p:style>
+          <a:lnRef idx="2">
+            <a:schemeClr val="accent1">
+              <a:shade val="50000"/>
+            </a:schemeClr>
+          </a:lnRef>
+          <a:fillRef idx="1">
+            <a:schemeClr val="accent1"/>
+          </a:fillRef>
+          <a:effectRef idx="0">
+            <a:schemeClr val="accent1"/>
+          </a:effectRef>
+          <a:fontRef idx="minor">
+            <a:schemeClr val="lt1"/>
+          </a:fontRef>
+        </p:style>
+        <p:txBody>
+          <a:bodyPr rtlCol="1" anchor="ctr"/>
+          <a:lstStyle/>
+          <a:p>
+            <a:pPr algn="ctr"/>
+            <a:r>
+              <a:rPr lang="en-IL" sz="1000" dirty="0">
+                <a:solidFill>
+                  <a:schemeClr val="tx1"/>
+                </a:solidFill>
+              </a:rPr>
+              <a:t>Cassandra</a:t>
+            </a:r>
+          </a:p>
+        </p:txBody>
+      </p:sp>
+      <p:sp>
+        <p:nvSpPr>
+          <p:cNvPr id="17" name="מלבן 16">
+            <a:extLst>
+              <a:ext uri="{FF2B5EF4-FFF2-40B4-BE49-F238E27FC236}">
+                <a16:creationId xmlns:a16="http://schemas.microsoft.com/office/drawing/2014/main" id="{618F29E6-D88B-4F12-8166-FCB57041544B}"/>
+              </a:ext>
+            </a:extLst>
+          </p:cNvPr>
+          <p:cNvSpPr/>
+          <p:nvPr/>
+        </p:nvSpPr>
+        <p:spPr>
+          <a:xfrm>
+            <a:off x="2347419" y="5844542"/>
+            <a:ext cx="991724" cy="321892"/>
+          </a:xfrm>
+          <a:prstGeom prst="rect">
+            <a:avLst/>
+          </a:prstGeom>
+          <a:noFill/>
+          <a:ln>
+            <a:solidFill>
+              <a:schemeClr val="accent1"/>
+            </a:solidFill>
+          </a:ln>
+        </p:spPr>
+        <p:style>
+          <a:lnRef idx="2">
+            <a:schemeClr val="accent1">
+              <a:shade val="50000"/>
+            </a:schemeClr>
+          </a:lnRef>
+          <a:fillRef idx="1">
+            <a:schemeClr val="accent1"/>
+          </a:fillRef>
+          <a:effectRef idx="0">
+            <a:schemeClr val="accent1"/>
+          </a:effectRef>
+          <a:fontRef idx="minor">
+            <a:schemeClr val="lt1"/>
+          </a:fontRef>
+        </p:style>
+        <p:txBody>
+          <a:bodyPr rtlCol="1" anchor="ctr"/>
+          <a:lstStyle/>
+          <a:p>
+            <a:pPr algn="ctr" rtl="0"/>
+            <a:r>
+              <a:rPr lang="en-IL" sz="1000" dirty="0">
+                <a:solidFill>
+                  <a:schemeClr val="tx1"/>
+                </a:solidFill>
+              </a:rPr>
+              <a:t>Short URL Service</a:t>
+            </a:r>
+          </a:p>
+        </p:txBody>
+      </p:sp>
+      <p:sp>
+        <p:nvSpPr>
+          <p:cNvPr id="18" name="מלבן 17">
+            <a:extLst>
+              <a:ext uri="{FF2B5EF4-FFF2-40B4-BE49-F238E27FC236}">
+                <a16:creationId xmlns:a16="http://schemas.microsoft.com/office/drawing/2014/main" id="{AE1E8653-5C03-42A3-8FCD-6E6F1FE7ABE9}"/>
+              </a:ext>
+            </a:extLst>
+          </p:cNvPr>
+          <p:cNvSpPr/>
+          <p:nvPr/>
+        </p:nvSpPr>
+        <p:spPr>
+          <a:xfrm>
+            <a:off x="5274050" y="5844542"/>
+            <a:ext cx="555942" cy="314274"/>
+          </a:xfrm>
+          <a:prstGeom prst="rect">
+            <a:avLst/>
+          </a:prstGeom>
+          <a:noFill/>
+          <a:ln>
+            <a:solidFill>
+              <a:srgbClr val="FF0000"/>
+            </a:solidFill>
+          </a:ln>
+        </p:spPr>
+        <p:style>
+          <a:lnRef idx="2">
+            <a:schemeClr val="accent1">
+              <a:shade val="50000"/>
+            </a:schemeClr>
+          </a:lnRef>
+          <a:fillRef idx="1">
+            <a:schemeClr val="accent1"/>
+          </a:fillRef>
+          <a:effectRef idx="0">
+            <a:schemeClr val="accent1"/>
+          </a:effectRef>
+          <a:fontRef idx="minor">
+            <a:schemeClr val="lt1"/>
+          </a:fontRef>
+        </p:style>
+        <p:txBody>
+          <a:bodyPr rtlCol="1" anchor="ctr"/>
+          <a:lstStyle/>
+          <a:p>
+            <a:pPr algn="ctr"/>
+            <a:r>
+              <a:rPr lang="en-IL" sz="1000" dirty="0">
+                <a:solidFill>
+                  <a:schemeClr val="tx1"/>
+                </a:solidFill>
+              </a:rPr>
+              <a:t>MySQL</a:t>
+            </a:r>
+          </a:p>
+        </p:txBody>
+      </p:sp>
+      <p:cxnSp>
+        <p:nvCxnSpPr>
+          <p:cNvPr id="19" name="מחבר חץ ישר 18">
+            <a:extLst>
+              <a:ext uri="{FF2B5EF4-FFF2-40B4-BE49-F238E27FC236}">
+                <a16:creationId xmlns:a16="http://schemas.microsoft.com/office/drawing/2014/main" id="{745D7131-E789-4C7C-84D4-3E76387DA56C}"/>
+              </a:ext>
+            </a:extLst>
+          </p:cNvPr>
+          <p:cNvCxnSpPr>
+            <a:cxnSpLocks/>
+            <a:stCxn id="11" idx="3"/>
+            <a:endCxn id="14" idx="1"/>
+          </p:cNvCxnSpPr>
+          <p:nvPr/>
+        </p:nvCxnSpPr>
+        <p:spPr>
+          <a:xfrm flipV="1">
+            <a:off x="1320554" y="5439978"/>
+            <a:ext cx="1026865" cy="200555"/>
+          </a:xfrm>
+          <a:prstGeom prst="straightConnector1">
+            <a:avLst/>
+          </a:prstGeom>
+          <a:ln>
+            <a:headEnd type="triangle"/>
+            <a:tailEnd type="triangle"/>
+          </a:ln>
+        </p:spPr>
+        <p:style>
+          <a:lnRef idx="1">
+            <a:schemeClr val="accent1"/>
+          </a:lnRef>
+          <a:fillRef idx="0">
+            <a:schemeClr val="accent1"/>
+          </a:fillRef>
+          <a:effectRef idx="0">
+            <a:schemeClr val="accent1"/>
+          </a:effectRef>
+          <a:fontRef idx="minor">
+            <a:schemeClr val="tx1"/>
+          </a:fontRef>
+        </p:style>
+      </p:cxnSp>
+      <p:cxnSp>
+        <p:nvCxnSpPr>
+          <p:cNvPr id="22" name="מחבר חץ ישר 21">
+            <a:extLst>
+              <a:ext uri="{FF2B5EF4-FFF2-40B4-BE49-F238E27FC236}">
+                <a16:creationId xmlns:a16="http://schemas.microsoft.com/office/drawing/2014/main" id="{5CE0C363-35F5-4CB3-9E76-402BBEE0742D}"/>
+              </a:ext>
+            </a:extLst>
+          </p:cNvPr>
+          <p:cNvCxnSpPr>
+            <a:cxnSpLocks/>
+            <a:stCxn id="11" idx="3"/>
+            <a:endCxn id="17" idx="1"/>
+          </p:cNvCxnSpPr>
+          <p:nvPr/>
+        </p:nvCxnSpPr>
+        <p:spPr>
+          <a:xfrm>
+            <a:off x="1320554" y="5640533"/>
+            <a:ext cx="1026865" cy="364955"/>
+          </a:xfrm>
+          <a:prstGeom prst="straightConnector1">
+            <a:avLst/>
+          </a:prstGeom>
+          <a:ln>
+            <a:headEnd type="triangle"/>
+            <a:tailEnd type="triangle"/>
+          </a:ln>
+        </p:spPr>
+        <p:style>
+          <a:lnRef idx="1">
+            <a:schemeClr val="accent1"/>
+          </a:lnRef>
+          <a:fillRef idx="0">
+            <a:schemeClr val="accent1"/>
+          </a:fillRef>
+          <a:effectRef idx="0">
+            <a:schemeClr val="accent1"/>
+          </a:effectRef>
+          <a:fontRef idx="minor">
+            <a:schemeClr val="tx1"/>
+          </a:fontRef>
+        </p:style>
+      </p:cxnSp>
+      <p:cxnSp>
+        <p:nvCxnSpPr>
+          <p:cNvPr id="25" name="מחבר חץ ישר 24">
+            <a:extLst>
+              <a:ext uri="{FF2B5EF4-FFF2-40B4-BE49-F238E27FC236}">
+                <a16:creationId xmlns:a16="http://schemas.microsoft.com/office/drawing/2014/main" id="{BA6465AB-9DB8-4987-BB94-D4F87F9847F3}"/>
+              </a:ext>
+            </a:extLst>
+          </p:cNvPr>
+          <p:cNvCxnSpPr>
+            <a:cxnSpLocks/>
+            <a:stCxn id="14" idx="3"/>
+            <a:endCxn id="15" idx="0"/>
+          </p:cNvCxnSpPr>
+          <p:nvPr/>
+        </p:nvCxnSpPr>
+        <p:spPr>
+          <a:xfrm>
+            <a:off x="3339143" y="5439978"/>
+            <a:ext cx="1040784" cy="404564"/>
+          </a:xfrm>
+          <a:prstGeom prst="straightConnector1">
+            <a:avLst/>
+          </a:prstGeom>
+          <a:ln>
+            <a:headEnd type="triangle"/>
+            <a:tailEnd type="triangle"/>
+          </a:ln>
+        </p:spPr>
+        <p:style>
+          <a:lnRef idx="1">
+            <a:schemeClr val="accent1"/>
+          </a:lnRef>
+          <a:fillRef idx="0">
+            <a:schemeClr val="accent1"/>
+          </a:fillRef>
+          <a:effectRef idx="0">
+            <a:schemeClr val="accent1"/>
+          </a:effectRef>
+          <a:fontRef idx="minor">
+            <a:schemeClr val="tx1"/>
+          </a:fontRef>
+        </p:style>
+      </p:cxnSp>
+      <p:cxnSp>
+        <p:nvCxnSpPr>
+          <p:cNvPr id="28" name="מחבר חץ ישר 27">
+            <a:extLst>
+              <a:ext uri="{FF2B5EF4-FFF2-40B4-BE49-F238E27FC236}">
+                <a16:creationId xmlns:a16="http://schemas.microsoft.com/office/drawing/2014/main" id="{7A8B10C4-BCC6-415F-8C60-99B356C53D45}"/>
+              </a:ext>
+            </a:extLst>
+          </p:cNvPr>
+          <p:cNvCxnSpPr>
+            <a:cxnSpLocks/>
+            <a:stCxn id="17" idx="3"/>
+            <a:endCxn id="15" idx="1"/>
+          </p:cNvCxnSpPr>
+          <p:nvPr/>
+        </p:nvCxnSpPr>
+        <p:spPr>
+          <a:xfrm>
+            <a:off x="3339143" y="6005488"/>
+            <a:ext cx="544922" cy="0"/>
+          </a:xfrm>
+          <a:prstGeom prst="straightConnector1">
+            <a:avLst/>
+          </a:prstGeom>
+          <a:ln>
+            <a:headEnd type="triangle"/>
+            <a:tailEnd type="triangle"/>
+          </a:ln>
+        </p:spPr>
+        <p:style>
+          <a:lnRef idx="1">
+            <a:schemeClr val="accent1"/>
+          </a:lnRef>
+          <a:fillRef idx="0">
+            <a:schemeClr val="accent1"/>
+          </a:fillRef>
+          <a:effectRef idx="0">
+            <a:schemeClr val="accent1"/>
+          </a:effectRef>
+          <a:fontRef idx="minor">
+            <a:schemeClr val="tx1"/>
+          </a:fontRef>
+        </p:style>
+      </p:cxnSp>
+      <p:cxnSp>
+        <p:nvCxnSpPr>
+          <p:cNvPr id="32" name="מחבר: מרפקי 31">
+            <a:extLst>
+              <a:ext uri="{FF2B5EF4-FFF2-40B4-BE49-F238E27FC236}">
+                <a16:creationId xmlns:a16="http://schemas.microsoft.com/office/drawing/2014/main" id="{35057820-FD7E-42EA-B10F-7ECF13DF6AA2}"/>
+              </a:ext>
+            </a:extLst>
+          </p:cNvPr>
+          <p:cNvCxnSpPr>
+            <a:cxnSpLocks/>
+          </p:cNvCxnSpPr>
+          <p:nvPr/>
+        </p:nvCxnSpPr>
+        <p:spPr>
+          <a:xfrm flipV="1">
+            <a:off x="3339143" y="5014405"/>
+            <a:ext cx="395848" cy="866388"/>
+          </a:xfrm>
+          <a:prstGeom prst="bentConnector2">
+            <a:avLst/>
+          </a:prstGeom>
+          <a:ln>
+            <a:tailEnd type="triangle"/>
+          </a:ln>
+        </p:spPr>
+        <p:style>
+          <a:lnRef idx="1">
+            <a:schemeClr val="accent1"/>
+          </a:lnRef>
+          <a:fillRef idx="0">
+            <a:schemeClr val="accent1"/>
+          </a:fillRef>
+          <a:effectRef idx="0">
+            <a:schemeClr val="accent1"/>
+          </a:effectRef>
+          <a:fontRef idx="minor">
+            <a:schemeClr val="tx1"/>
+          </a:fontRef>
+        </p:style>
+      </p:cxnSp>
+      <p:cxnSp>
+        <p:nvCxnSpPr>
+          <p:cNvPr id="37" name="מחבר: מרפקי 36">
+            <a:extLst>
+              <a:ext uri="{FF2B5EF4-FFF2-40B4-BE49-F238E27FC236}">
+                <a16:creationId xmlns:a16="http://schemas.microsoft.com/office/drawing/2014/main" id="{DF21A41D-2FBA-422A-B737-1ABB76C0995B}"/>
+              </a:ext>
+            </a:extLst>
+          </p:cNvPr>
+          <p:cNvCxnSpPr>
+            <a:cxnSpLocks/>
+          </p:cNvCxnSpPr>
+          <p:nvPr/>
+        </p:nvCxnSpPr>
+        <p:spPr>
+          <a:xfrm flipV="1">
+            <a:off x="3339143" y="5006090"/>
+            <a:ext cx="795716" cy="375697"/>
+          </a:xfrm>
+          <a:prstGeom prst="bentConnector2">
+            <a:avLst/>
+          </a:prstGeom>
+          <a:ln>
+            <a:tailEnd type="triangle"/>
+          </a:ln>
+        </p:spPr>
+        <p:style>
+          <a:lnRef idx="1">
+            <a:schemeClr val="accent1"/>
+          </a:lnRef>
+          <a:fillRef idx="0">
+            <a:schemeClr val="accent1"/>
+          </a:fillRef>
+          <a:effectRef idx="0">
+            <a:schemeClr val="accent1"/>
+          </a:effectRef>
+          <a:fontRef idx="minor">
+            <a:schemeClr val="tx1"/>
+          </a:fontRef>
+        </p:style>
+      </p:cxnSp>
+      <p:cxnSp>
+        <p:nvCxnSpPr>
+          <p:cNvPr id="40" name="מחבר חץ ישר 39">
+            <a:extLst>
+              <a:ext uri="{FF2B5EF4-FFF2-40B4-BE49-F238E27FC236}">
+                <a16:creationId xmlns:a16="http://schemas.microsoft.com/office/drawing/2014/main" id="{5C600343-2DA0-49B4-8DCC-E8E918A380B8}"/>
+              </a:ext>
+            </a:extLst>
+          </p:cNvPr>
+          <p:cNvCxnSpPr>
+            <a:cxnSpLocks/>
+            <a:stCxn id="15" idx="3"/>
+            <a:endCxn id="18" idx="1"/>
+          </p:cNvCxnSpPr>
+          <p:nvPr/>
+        </p:nvCxnSpPr>
+        <p:spPr>
+          <a:xfrm flipV="1">
+            <a:off x="4875789" y="6001679"/>
+            <a:ext cx="398261" cy="3809"/>
+          </a:xfrm>
+          <a:prstGeom prst="straightConnector1">
+            <a:avLst/>
+          </a:prstGeom>
+          <a:ln>
+            <a:headEnd type="triangle"/>
+            <a:tailEnd type="triangle"/>
+          </a:ln>
+        </p:spPr>
+        <p:style>
+          <a:lnRef idx="1">
+            <a:schemeClr val="accent1"/>
+          </a:lnRef>
+          <a:fillRef idx="0">
+            <a:schemeClr val="accent1"/>
+          </a:fillRef>
+          <a:effectRef idx="0">
+            <a:schemeClr val="accent1"/>
+          </a:effectRef>
+          <a:fontRef idx="minor">
+            <a:schemeClr val="tx1"/>
+          </a:fontRef>
+        </p:style>
+      </p:cxnSp>
+      <p:sp>
+        <p:nvSpPr>
+          <p:cNvPr id="43" name="תיבת טקסט 42">
+            <a:extLst>
+              <a:ext uri="{FF2B5EF4-FFF2-40B4-BE49-F238E27FC236}">
+                <a16:creationId xmlns:a16="http://schemas.microsoft.com/office/drawing/2014/main" id="{B7573210-7044-456C-9767-4BCDB66E5700}"/>
+              </a:ext>
+            </a:extLst>
+          </p:cNvPr>
+          <p:cNvSpPr txBox="1"/>
+          <p:nvPr/>
+        </p:nvSpPr>
+        <p:spPr>
+          <a:xfrm>
+            <a:off x="2308143" y="6209497"/>
+            <a:ext cx="1040784" cy="369332"/>
+          </a:xfrm>
+          <a:prstGeom prst="rect">
+            <a:avLst/>
+          </a:prstGeom>
+          <a:noFill/>
+        </p:spPr>
+        <p:txBody>
+          <a:bodyPr wrap="square" rtlCol="1">
+            <a:spAutoFit/>
+          </a:bodyPr>
+          <a:lstStyle/>
+          <a:p>
+            <a:pPr algn="ctr" rtl="0"/>
+            <a:r>
+              <a:rPr lang="en-IL" sz="900" dirty="0"/>
+              <a:t>100,001 – 200,000</a:t>
+            </a:r>
+            <a:br>
+              <a:rPr lang="en-IL" sz="900" dirty="0"/>
+            </a:br>
+            <a:r>
+              <a:rPr lang="en-IL" sz="900" dirty="0"/>
+              <a:t>Range</a:t>
+            </a:r>
+            <a:endParaRPr lang="he-IL" sz="900" dirty="0"/>
+          </a:p>
+        </p:txBody>
+      </p:sp>
+      <p:sp>
+        <p:nvSpPr>
+          <p:cNvPr id="44" name="תיבת טקסט 43">
+            <a:extLst>
+              <a:ext uri="{FF2B5EF4-FFF2-40B4-BE49-F238E27FC236}">
+                <a16:creationId xmlns:a16="http://schemas.microsoft.com/office/drawing/2014/main" id="{489AA73C-6659-4D81-9B7B-9A9B76886C64}"/>
+              </a:ext>
+            </a:extLst>
+          </p:cNvPr>
+          <p:cNvSpPr txBox="1"/>
+          <p:nvPr/>
+        </p:nvSpPr>
+        <p:spPr>
+          <a:xfrm>
+            <a:off x="2322889" y="4889580"/>
+            <a:ext cx="1040784" cy="369332"/>
+          </a:xfrm>
+          <a:prstGeom prst="rect">
+            <a:avLst/>
+          </a:prstGeom>
+          <a:noFill/>
+        </p:spPr>
+        <p:txBody>
+          <a:bodyPr wrap="square" rtlCol="1">
+            <a:spAutoFit/>
+          </a:bodyPr>
+          <a:lstStyle/>
+          <a:p>
+            <a:pPr algn="l" rtl="0"/>
+            <a:r>
+              <a:rPr lang="en-IL" sz="900" dirty="0"/>
+              <a:t>200,001 – 300,000</a:t>
+            </a:r>
+          </a:p>
+          <a:p>
+            <a:pPr algn="ctr" rtl="0"/>
+            <a:r>
+              <a:rPr lang="en-IL" sz="900" dirty="0"/>
+              <a:t>Range</a:t>
+            </a:r>
+            <a:endParaRPr lang="he-IL" sz="900" dirty="0"/>
+          </a:p>
+        </p:txBody>
+      </p:sp>
+      <p:sp>
+        <p:nvSpPr>
+          <p:cNvPr id="45" name="תיבת טקסט 44">
+            <a:extLst>
+              <a:ext uri="{FF2B5EF4-FFF2-40B4-BE49-F238E27FC236}">
+                <a16:creationId xmlns:a16="http://schemas.microsoft.com/office/drawing/2014/main" id="{AE3188A5-7996-439E-8D91-ADD4ADDAF90D}"/>
+              </a:ext>
+            </a:extLst>
+          </p:cNvPr>
+          <p:cNvSpPr txBox="1"/>
+          <p:nvPr/>
+        </p:nvSpPr>
+        <p:spPr>
+          <a:xfrm>
+            <a:off x="3230822" y="6415377"/>
+            <a:ext cx="2292925" cy="369332"/>
+          </a:xfrm>
+          <a:prstGeom prst="rect">
+            <a:avLst/>
+          </a:prstGeom>
+          <a:noFill/>
+        </p:spPr>
+        <p:txBody>
+          <a:bodyPr wrap="square" rtlCol="1">
+            <a:spAutoFit/>
+          </a:bodyPr>
+          <a:lstStyle/>
+          <a:p>
+            <a:pPr algn="l" rtl="0"/>
+            <a:r>
+              <a:rPr lang="en-IL" sz="900" dirty="0"/>
+              <a:t>Very low traffic, so it is single threaded and</a:t>
+            </a:r>
+            <a:br>
+              <a:rPr lang="en-IL" sz="900" dirty="0"/>
+            </a:br>
+            <a:r>
+              <a:rPr lang="en-IL" sz="900" dirty="0"/>
+              <a:t>is not scaled but has a backup machines</a:t>
+            </a:r>
+          </a:p>
+        </p:txBody>
+      </p:sp>
+      <p:cxnSp>
+        <p:nvCxnSpPr>
+          <p:cNvPr id="49" name="מחבר חץ ישר 48">
+            <a:extLst>
+              <a:ext uri="{FF2B5EF4-FFF2-40B4-BE49-F238E27FC236}">
+                <a16:creationId xmlns:a16="http://schemas.microsoft.com/office/drawing/2014/main" id="{368C9AD5-194C-47A0-AEEB-4A7940C6479D}"/>
+              </a:ext>
+            </a:extLst>
+          </p:cNvPr>
+          <p:cNvCxnSpPr>
+            <a:cxnSpLocks/>
+            <a:stCxn id="45" idx="0"/>
+            <a:endCxn id="15" idx="2"/>
+          </p:cNvCxnSpPr>
+          <p:nvPr/>
+        </p:nvCxnSpPr>
+        <p:spPr>
+          <a:xfrm flipV="1">
+            <a:off x="4377285" y="6166434"/>
+            <a:ext cx="2642" cy="248943"/>
+          </a:xfrm>
+          <a:prstGeom prst="straightConnector1">
+            <a:avLst/>
+          </a:prstGeom>
+          <a:ln>
+            <a:tailEnd type="triangle"/>
+          </a:ln>
+        </p:spPr>
+        <p:style>
+          <a:lnRef idx="1">
+            <a:schemeClr val="dk1"/>
+          </a:lnRef>
+          <a:fillRef idx="0">
+            <a:schemeClr val="dk1"/>
+          </a:fillRef>
+          <a:effectRef idx="0">
+            <a:schemeClr val="dk1"/>
+          </a:effectRef>
+          <a:fontRef idx="minor">
+            <a:schemeClr val="tx1"/>
+          </a:fontRef>
+        </p:style>
+      </p:cxnSp>
+      <p:sp>
+        <p:nvSpPr>
+          <p:cNvPr id="55" name="תיבת טקסט 54">
+            <a:extLst>
+              <a:ext uri="{FF2B5EF4-FFF2-40B4-BE49-F238E27FC236}">
+                <a16:creationId xmlns:a16="http://schemas.microsoft.com/office/drawing/2014/main" id="{46BEF879-2D53-4AC7-A0FC-C1DD28FB0E25}"/>
+              </a:ext>
+            </a:extLst>
+          </p:cNvPr>
+          <p:cNvSpPr txBox="1"/>
+          <p:nvPr/>
+        </p:nvSpPr>
+        <p:spPr>
+          <a:xfrm>
+            <a:off x="435423" y="4204390"/>
+            <a:ext cx="2440194" cy="369332"/>
+          </a:xfrm>
+          <a:prstGeom prst="rect">
+            <a:avLst/>
+          </a:prstGeom>
+          <a:noFill/>
+        </p:spPr>
+        <p:txBody>
+          <a:bodyPr wrap="square" rtlCol="1">
+            <a:spAutoFit/>
+          </a:bodyPr>
+          <a:lstStyle/>
+          <a:p>
+            <a:pPr algn="l" rtl="0"/>
+            <a:r>
+              <a:rPr lang="en-IL" sz="900" dirty="0"/>
+              <a:t>Take a number in the range, convert it to base 62, write to Cassandra and return to the caller</a:t>
+            </a:r>
+          </a:p>
+        </p:txBody>
+      </p:sp>
+      <p:cxnSp>
+        <p:nvCxnSpPr>
+          <p:cNvPr id="56" name="מחבר חץ ישר 55">
+            <a:extLst>
+              <a:ext uri="{FF2B5EF4-FFF2-40B4-BE49-F238E27FC236}">
+                <a16:creationId xmlns:a16="http://schemas.microsoft.com/office/drawing/2014/main" id="{A1150A80-7E9E-4D62-B241-5F5882367DED}"/>
+              </a:ext>
+            </a:extLst>
+          </p:cNvPr>
+          <p:cNvCxnSpPr>
+            <a:cxnSpLocks/>
+            <a:stCxn id="55" idx="2"/>
+          </p:cNvCxnSpPr>
+          <p:nvPr/>
+        </p:nvCxnSpPr>
+        <p:spPr>
+          <a:xfrm>
+            <a:off x="1655520" y="4573722"/>
+            <a:ext cx="652623" cy="617406"/>
+          </a:xfrm>
+          <a:prstGeom prst="straightConnector1">
+            <a:avLst/>
+          </a:prstGeom>
+          <a:ln>
+            <a:tailEnd type="triangle"/>
+          </a:ln>
+        </p:spPr>
+        <p:style>
+          <a:lnRef idx="1">
+            <a:schemeClr val="dk1"/>
+          </a:lnRef>
+          <a:fillRef idx="0">
+            <a:schemeClr val="dk1"/>
+          </a:fillRef>
+          <a:effectRef idx="0">
+            <a:schemeClr val="dk1"/>
+          </a:effectRef>
+          <a:fontRef idx="minor">
+            <a:schemeClr val="tx1"/>
+          </a:fontRef>
+        </p:style>
+      </p:cxnSp>
+      <p:sp>
+        <p:nvSpPr>
+          <p:cNvPr id="62" name="תיבת טקסט 61">
+            <a:extLst>
+              <a:ext uri="{FF2B5EF4-FFF2-40B4-BE49-F238E27FC236}">
+                <a16:creationId xmlns:a16="http://schemas.microsoft.com/office/drawing/2014/main" id="{BEA5520E-A7F3-4240-AC61-1BEF6BA669A8}"/>
+              </a:ext>
+            </a:extLst>
+          </p:cNvPr>
+          <p:cNvSpPr txBox="1"/>
+          <p:nvPr/>
+        </p:nvSpPr>
+        <p:spPr>
+          <a:xfrm>
+            <a:off x="4543072" y="5006090"/>
+            <a:ext cx="2305926" cy="507831"/>
+          </a:xfrm>
+          <a:prstGeom prst="rect">
+            <a:avLst/>
+          </a:prstGeom>
+          <a:noFill/>
+        </p:spPr>
+        <p:txBody>
+          <a:bodyPr wrap="square">
+            <a:spAutoFit/>
+          </a:bodyPr>
+          <a:lstStyle/>
+          <a:p>
+            <a:pPr algn="l" rtl="0"/>
+            <a:r>
+              <a:rPr lang="en-IL" sz="900" dirty="0"/>
+              <a:t>Increasing </a:t>
+            </a:r>
+            <a:r>
+              <a:rPr lang="en-US" sz="900" dirty="0"/>
+              <a:t>the length of our range. That would mean that machines will approach the token service at a much lower frequency.</a:t>
+            </a:r>
+            <a:endParaRPr lang="he-IL" sz="900" dirty="0"/>
+          </a:p>
+        </p:txBody>
+      </p:sp>
+      <p:cxnSp>
+        <p:nvCxnSpPr>
+          <p:cNvPr id="63" name="מחבר חץ ישר 62">
+            <a:extLst>
+              <a:ext uri="{FF2B5EF4-FFF2-40B4-BE49-F238E27FC236}">
+                <a16:creationId xmlns:a16="http://schemas.microsoft.com/office/drawing/2014/main" id="{5EDF8B2C-885B-4476-828C-F19BBFA5EC66}"/>
+              </a:ext>
+            </a:extLst>
+          </p:cNvPr>
+          <p:cNvCxnSpPr>
+            <a:cxnSpLocks/>
+          </p:cNvCxnSpPr>
+          <p:nvPr/>
+        </p:nvCxnSpPr>
+        <p:spPr>
+          <a:xfrm flipH="1">
+            <a:off x="4896729" y="5487105"/>
+            <a:ext cx="377321" cy="331801"/>
+          </a:xfrm>
+          <a:prstGeom prst="straightConnector1">
+            <a:avLst/>
+          </a:prstGeom>
+          <a:ln>
+            <a:tailEnd type="triangle"/>
+          </a:ln>
+        </p:spPr>
+        <p:style>
+          <a:lnRef idx="1">
+            <a:schemeClr val="dk1"/>
+          </a:lnRef>
+          <a:fillRef idx="0">
+            <a:schemeClr val="dk1"/>
+          </a:fillRef>
+          <a:effectRef idx="0">
+            <a:schemeClr val="dk1"/>
+          </a:effectRef>
+          <a:fontRef idx="minor">
+            <a:schemeClr val="tx1"/>
+          </a:fontRef>
+        </p:style>
+      </p:cxnSp>
+    </p:spTree>
+    <p:extLst>
+      <p:ext uri="{BB962C8B-B14F-4D97-AF65-F5344CB8AC3E}">
+        <p14:creationId xmlns:p14="http://schemas.microsoft.com/office/powerpoint/2010/main" val="2472357877"/>
       </p:ext>
     </p:extLst>
   </p:cSld>

</xml_diff>